<commit_message>
Add mower functions in class diagram
</commit_message>
<xml_diff>
--- a/Documents/Diagramme.pptx
+++ b/Documents/Diagramme.pptx
@@ -107,6 +107,11 @@
       </a:defRPr>
     </a:lvl9pPr>
   </p:defaultTextStyle>
+  <p:extLst>
+    <p:ext uri="{EFAFB233-063F-42B5-8137-9DF3F51BA10A}">
+      <p15:sldGuideLst xmlns:p15="http://schemas.microsoft.com/office/powerpoint/2012/main"/>
+    </p:ext>
+  </p:extLst>
 </p:presentation>
 </file>
 
@@ -259,7 +264,7 @@
               <a:rPr lang="de-DE" smtClean="0"/>
               <a:t>04.01.2019</a:t>
             </a:fld>
-            <a:endParaRPr lang="de-DE"/>
+            <a:endParaRPr lang="de-DE" dirty="0"/>
           </a:p>
         </p:txBody>
       </p:sp>
@@ -284,7 +289,7 @@
           <a:bodyPr/>
           <a:lstStyle/>
           <a:p>
-            <a:endParaRPr lang="de-DE"/>
+            <a:endParaRPr lang="de-DE" dirty="0"/>
           </a:p>
         </p:txBody>
       </p:sp>
@@ -313,7 +318,7 @@
               <a:rPr lang="de-DE" smtClean="0"/>
               <a:t>‹Nr.›</a:t>
             </a:fld>
-            <a:endParaRPr lang="de-DE"/>
+            <a:endParaRPr lang="de-DE" dirty="0"/>
           </a:p>
         </p:txBody>
       </p:sp>
@@ -457,7 +462,7 @@
               <a:rPr lang="de-DE" smtClean="0"/>
               <a:t>04.01.2019</a:t>
             </a:fld>
-            <a:endParaRPr lang="de-DE"/>
+            <a:endParaRPr lang="de-DE" dirty="0"/>
           </a:p>
         </p:txBody>
       </p:sp>
@@ -482,7 +487,7 @@
           <a:bodyPr/>
           <a:lstStyle/>
           <a:p>
-            <a:endParaRPr lang="de-DE"/>
+            <a:endParaRPr lang="de-DE" dirty="0"/>
           </a:p>
         </p:txBody>
       </p:sp>
@@ -511,7 +516,7 @@
               <a:rPr lang="de-DE" smtClean="0"/>
               <a:t>‹Nr.›</a:t>
             </a:fld>
-            <a:endParaRPr lang="de-DE"/>
+            <a:endParaRPr lang="de-DE" dirty="0"/>
           </a:p>
         </p:txBody>
       </p:sp>
@@ -665,7 +670,7 @@
               <a:rPr lang="de-DE" smtClean="0"/>
               <a:t>04.01.2019</a:t>
             </a:fld>
-            <a:endParaRPr lang="de-DE"/>
+            <a:endParaRPr lang="de-DE" dirty="0"/>
           </a:p>
         </p:txBody>
       </p:sp>
@@ -690,7 +695,7 @@
           <a:bodyPr/>
           <a:lstStyle/>
           <a:p>
-            <a:endParaRPr lang="de-DE"/>
+            <a:endParaRPr lang="de-DE" dirty="0"/>
           </a:p>
         </p:txBody>
       </p:sp>
@@ -719,7 +724,7 @@
               <a:rPr lang="de-DE" smtClean="0"/>
               <a:t>‹Nr.›</a:t>
             </a:fld>
-            <a:endParaRPr lang="de-DE"/>
+            <a:endParaRPr lang="de-DE" dirty="0"/>
           </a:p>
         </p:txBody>
       </p:sp>
@@ -863,7 +868,7 @@
               <a:rPr lang="de-DE" smtClean="0"/>
               <a:t>04.01.2019</a:t>
             </a:fld>
-            <a:endParaRPr lang="de-DE"/>
+            <a:endParaRPr lang="de-DE" dirty="0"/>
           </a:p>
         </p:txBody>
       </p:sp>
@@ -888,7 +893,7 @@
           <a:bodyPr/>
           <a:lstStyle/>
           <a:p>
-            <a:endParaRPr lang="de-DE"/>
+            <a:endParaRPr lang="de-DE" dirty="0"/>
           </a:p>
         </p:txBody>
       </p:sp>
@@ -917,7 +922,7 @@
               <a:rPr lang="de-DE" smtClean="0"/>
               <a:t>‹Nr.›</a:t>
             </a:fld>
-            <a:endParaRPr lang="de-DE"/>
+            <a:endParaRPr lang="de-DE" dirty="0"/>
           </a:p>
         </p:txBody>
       </p:sp>
@@ -1138,7 +1143,7 @@
               <a:rPr lang="de-DE" smtClean="0"/>
               <a:t>04.01.2019</a:t>
             </a:fld>
-            <a:endParaRPr lang="de-DE"/>
+            <a:endParaRPr lang="de-DE" dirty="0"/>
           </a:p>
         </p:txBody>
       </p:sp>
@@ -1163,7 +1168,7 @@
           <a:bodyPr/>
           <a:lstStyle/>
           <a:p>
-            <a:endParaRPr lang="de-DE"/>
+            <a:endParaRPr lang="de-DE" dirty="0"/>
           </a:p>
         </p:txBody>
       </p:sp>
@@ -1192,7 +1197,7 @@
               <a:rPr lang="de-DE" smtClean="0"/>
               <a:t>‹Nr.›</a:t>
             </a:fld>
-            <a:endParaRPr lang="de-DE"/>
+            <a:endParaRPr lang="de-DE" dirty="0"/>
           </a:p>
         </p:txBody>
       </p:sp>
@@ -1403,7 +1408,7 @@
               <a:rPr lang="de-DE" smtClean="0"/>
               <a:t>04.01.2019</a:t>
             </a:fld>
-            <a:endParaRPr lang="de-DE"/>
+            <a:endParaRPr lang="de-DE" dirty="0"/>
           </a:p>
         </p:txBody>
       </p:sp>
@@ -1428,7 +1433,7 @@
           <a:bodyPr/>
           <a:lstStyle/>
           <a:p>
-            <a:endParaRPr lang="de-DE"/>
+            <a:endParaRPr lang="de-DE" dirty="0"/>
           </a:p>
         </p:txBody>
       </p:sp>
@@ -1457,7 +1462,7 @@
               <a:rPr lang="de-DE" smtClean="0"/>
               <a:t>‹Nr.›</a:t>
             </a:fld>
-            <a:endParaRPr lang="de-DE"/>
+            <a:endParaRPr lang="de-DE" dirty="0"/>
           </a:p>
         </p:txBody>
       </p:sp>
@@ -1815,7 +1820,7 @@
               <a:rPr lang="de-DE" smtClean="0"/>
               <a:t>04.01.2019</a:t>
             </a:fld>
-            <a:endParaRPr lang="de-DE"/>
+            <a:endParaRPr lang="de-DE" dirty="0"/>
           </a:p>
         </p:txBody>
       </p:sp>
@@ -1840,7 +1845,7 @@
           <a:bodyPr/>
           <a:lstStyle/>
           <a:p>
-            <a:endParaRPr lang="de-DE"/>
+            <a:endParaRPr lang="de-DE" dirty="0"/>
           </a:p>
         </p:txBody>
       </p:sp>
@@ -1869,7 +1874,7 @@
               <a:rPr lang="de-DE" smtClean="0"/>
               <a:t>‹Nr.›</a:t>
             </a:fld>
-            <a:endParaRPr lang="de-DE"/>
+            <a:endParaRPr lang="de-DE" dirty="0"/>
           </a:p>
         </p:txBody>
       </p:sp>
@@ -1956,7 +1961,7 @@
               <a:rPr lang="de-DE" smtClean="0"/>
               <a:t>04.01.2019</a:t>
             </a:fld>
-            <a:endParaRPr lang="de-DE"/>
+            <a:endParaRPr lang="de-DE" dirty="0"/>
           </a:p>
         </p:txBody>
       </p:sp>
@@ -1981,7 +1986,7 @@
           <a:bodyPr/>
           <a:lstStyle/>
           <a:p>
-            <a:endParaRPr lang="de-DE"/>
+            <a:endParaRPr lang="de-DE" dirty="0"/>
           </a:p>
         </p:txBody>
       </p:sp>
@@ -2010,7 +2015,7 @@
               <a:rPr lang="de-DE" smtClean="0"/>
               <a:t>‹Nr.›</a:t>
             </a:fld>
-            <a:endParaRPr lang="de-DE"/>
+            <a:endParaRPr lang="de-DE" dirty="0"/>
           </a:p>
         </p:txBody>
       </p:sp>
@@ -2069,7 +2074,7 @@
               <a:rPr lang="de-DE" smtClean="0"/>
               <a:t>04.01.2019</a:t>
             </a:fld>
-            <a:endParaRPr lang="de-DE"/>
+            <a:endParaRPr lang="de-DE" dirty="0"/>
           </a:p>
         </p:txBody>
       </p:sp>
@@ -2094,7 +2099,7 @@
           <a:bodyPr/>
           <a:lstStyle/>
           <a:p>
-            <a:endParaRPr lang="de-DE"/>
+            <a:endParaRPr lang="de-DE" dirty="0"/>
           </a:p>
         </p:txBody>
       </p:sp>
@@ -2123,7 +2128,7 @@
               <a:rPr lang="de-DE" smtClean="0"/>
               <a:t>‹Nr.›</a:t>
             </a:fld>
-            <a:endParaRPr lang="de-DE"/>
+            <a:endParaRPr lang="de-DE" dirty="0"/>
           </a:p>
         </p:txBody>
       </p:sp>
@@ -2380,7 +2385,7 @@
               <a:rPr lang="de-DE" smtClean="0"/>
               <a:t>04.01.2019</a:t>
             </a:fld>
-            <a:endParaRPr lang="de-DE"/>
+            <a:endParaRPr lang="de-DE" dirty="0"/>
           </a:p>
         </p:txBody>
       </p:sp>
@@ -2405,7 +2410,7 @@
           <a:bodyPr/>
           <a:lstStyle/>
           <a:p>
-            <a:endParaRPr lang="de-DE"/>
+            <a:endParaRPr lang="de-DE" dirty="0"/>
           </a:p>
         </p:txBody>
       </p:sp>
@@ -2434,7 +2439,7 @@
               <a:rPr lang="de-DE" smtClean="0"/>
               <a:t>‹Nr.›</a:t>
             </a:fld>
-            <a:endParaRPr lang="de-DE"/>
+            <a:endParaRPr lang="de-DE" dirty="0"/>
           </a:p>
         </p:txBody>
       </p:sp>
@@ -2568,7 +2573,7 @@
             </a:lvl9pPr>
           </a:lstStyle>
           <a:p>
-            <a:endParaRPr lang="de-DE"/>
+            <a:endParaRPr lang="de-DE" dirty="0"/>
           </a:p>
         </p:txBody>
       </p:sp>
@@ -2668,7 +2673,7 @@
               <a:rPr lang="de-DE" smtClean="0"/>
               <a:t>04.01.2019</a:t>
             </a:fld>
-            <a:endParaRPr lang="de-DE"/>
+            <a:endParaRPr lang="de-DE" dirty="0"/>
           </a:p>
         </p:txBody>
       </p:sp>
@@ -2693,7 +2698,7 @@
           <a:bodyPr/>
           <a:lstStyle/>
           <a:p>
-            <a:endParaRPr lang="de-DE"/>
+            <a:endParaRPr lang="de-DE" dirty="0"/>
           </a:p>
         </p:txBody>
       </p:sp>
@@ -2722,7 +2727,7 @@
               <a:rPr lang="de-DE" smtClean="0"/>
               <a:t>‹Nr.›</a:t>
             </a:fld>
-            <a:endParaRPr lang="de-DE"/>
+            <a:endParaRPr lang="de-DE" dirty="0"/>
           </a:p>
         </p:txBody>
       </p:sp>
@@ -2909,7 +2914,7 @@
               <a:rPr lang="de-DE" smtClean="0"/>
               <a:t>04.01.2019</a:t>
             </a:fld>
-            <a:endParaRPr lang="de-DE"/>
+            <a:endParaRPr lang="de-DE" dirty="0"/>
           </a:p>
         </p:txBody>
       </p:sp>
@@ -2952,7 +2957,7 @@
             </a:lvl1pPr>
           </a:lstStyle>
           <a:p>
-            <a:endParaRPr lang="de-DE"/>
+            <a:endParaRPr lang="de-DE" dirty="0"/>
           </a:p>
         </p:txBody>
       </p:sp>
@@ -2999,7 +3004,7 @@
               <a:rPr lang="de-DE" smtClean="0"/>
               <a:t>‹Nr.›</a:t>
             </a:fld>
-            <a:endParaRPr lang="de-DE"/>
+            <a:endParaRPr lang="de-DE" dirty="0"/>
           </a:p>
         </p:txBody>
       </p:sp>
@@ -3383,7 +3388,7 @@
               <a:tabLst/>
             </a:pPr>
             <a:r>
-              <a:rPr kumimoji="0" lang="de-DE" altLang="de-DE" sz="1100" b="0" i="0" u="none" strike="noStrike" cap="none" normalizeH="0" baseline="0">
+              <a:rPr kumimoji="0" lang="de-DE" altLang="de-DE" sz="1100" b="0" i="0" u="none" strike="noStrike" cap="none" normalizeH="0" baseline="0" dirty="0">
                 <a:ln>
                   <a:noFill/>
                 </a:ln>
@@ -3397,7 +3402,7 @@
               </a:rPr>
               <a:t>Startup</a:t>
             </a:r>
-            <a:endParaRPr kumimoji="0" lang="de-DE" altLang="de-DE" sz="1800" b="0" i="0" u="none" strike="noStrike" cap="none" normalizeH="0" baseline="0">
+            <a:endParaRPr kumimoji="0" lang="de-DE" altLang="de-DE" sz="1800" b="0" i="0" u="none" strike="noStrike" cap="none" normalizeH="0" baseline="0" dirty="0">
               <a:ln>
                 <a:noFill/>
               </a:ln>
@@ -3469,7 +3474,7 @@
               <a:tabLst/>
             </a:pPr>
             <a:r>
-              <a:rPr kumimoji="0" lang="de-DE" altLang="de-DE" sz="1100" b="0" i="0" u="none" strike="noStrike" cap="none" normalizeH="0" baseline="0">
+              <a:rPr kumimoji="0" lang="de-DE" altLang="de-DE" sz="1100" b="0" i="0" u="none" strike="noStrike" cap="none" normalizeH="0" baseline="0" dirty="0">
                 <a:ln>
                   <a:noFill/>
                 </a:ln>
@@ -3483,7 +3488,7 @@
               </a:rPr>
               <a:t>Fahrbereitschaft</a:t>
             </a:r>
-            <a:endParaRPr kumimoji="0" lang="de-DE" altLang="de-DE" sz="1800" b="0" i="0" u="none" strike="noStrike" cap="none" normalizeH="0" baseline="0">
+            <a:endParaRPr kumimoji="0" lang="de-DE" altLang="de-DE" sz="1800" b="0" i="0" u="none" strike="noStrike" cap="none" normalizeH="0" baseline="0" dirty="0">
               <a:ln>
                 <a:noFill/>
               </a:ln>
@@ -3555,7 +3560,7 @@
               <a:tabLst/>
             </a:pPr>
             <a:r>
-              <a:rPr kumimoji="0" lang="de-DE" altLang="de-DE" sz="1100" b="0" i="0" u="none" strike="noStrike" cap="none" normalizeH="0" baseline="0">
+              <a:rPr kumimoji="0" lang="de-DE" altLang="de-DE" sz="1100" b="0" i="0" u="none" strike="noStrike" cap="none" normalizeH="0" baseline="0" dirty="0">
                 <a:ln>
                   <a:noFill/>
                 </a:ln>
@@ -3569,7 +3574,7 @@
               </a:rPr>
               <a:t>Fahren</a:t>
             </a:r>
-            <a:endParaRPr kumimoji="0" lang="de-DE" altLang="de-DE" sz="1800" b="0" i="0" u="none" strike="noStrike" cap="none" normalizeH="0" baseline="0">
+            <a:endParaRPr kumimoji="0" lang="de-DE" altLang="de-DE" sz="1800" b="0" i="0" u="none" strike="noStrike" cap="none" normalizeH="0" baseline="0" dirty="0">
               <a:ln>
                 <a:noFill/>
               </a:ln>
@@ -3641,7 +3646,7 @@
               <a:tabLst/>
             </a:pPr>
             <a:r>
-              <a:rPr kumimoji="0" lang="de-DE" altLang="de-DE" sz="1100" b="0" i="0" u="none" strike="noStrike" cap="none" normalizeH="0" baseline="0">
+              <a:rPr kumimoji="0" lang="de-DE" altLang="de-DE" sz="1100" b="0" i="0" u="none" strike="noStrike" cap="none" normalizeH="0" baseline="0" dirty="0">
                 <a:ln>
                   <a:noFill/>
                 </a:ln>
@@ -3655,7 +3660,7 @@
               </a:rPr>
               <a:t>Fehler</a:t>
             </a:r>
-            <a:endParaRPr kumimoji="0" lang="de-DE" altLang="de-DE" sz="1800" b="0" i="0" u="none" strike="noStrike" cap="none" normalizeH="0" baseline="0">
+            <a:endParaRPr kumimoji="0" lang="de-DE" altLang="de-DE" sz="1800" b="0" i="0" u="none" strike="noStrike" cap="none" normalizeH="0" baseline="0" dirty="0">
               <a:ln>
                 <a:noFill/>
               </a:ln>
@@ -3715,7 +3720,7 @@
           </a:bodyPr>
           <a:lstStyle/>
           <a:p>
-            <a:endParaRPr lang="de-DE"/>
+            <a:endParaRPr lang="de-DE" dirty="0"/>
           </a:p>
         </p:txBody>
       </p:sp>
@@ -3766,7 +3771,7 @@
           </a:bodyPr>
           <a:lstStyle/>
           <a:p>
-            <a:endParaRPr lang="de-DE"/>
+            <a:endParaRPr lang="de-DE" dirty="0"/>
           </a:p>
         </p:txBody>
       </p:sp>
@@ -3817,7 +3822,7 @@
           </a:bodyPr>
           <a:lstStyle/>
           <a:p>
-            <a:endParaRPr lang="de-DE"/>
+            <a:endParaRPr lang="de-DE" dirty="0"/>
           </a:p>
         </p:txBody>
       </p:sp>
@@ -3868,7 +3873,7 @@
           </a:bodyPr>
           <a:lstStyle/>
           <a:p>
-            <a:endParaRPr lang="de-DE"/>
+            <a:endParaRPr lang="de-DE" dirty="0"/>
           </a:p>
         </p:txBody>
       </p:sp>
@@ -3919,7 +3924,7 @@
           </a:bodyPr>
           <a:lstStyle/>
           <a:p>
-            <a:endParaRPr lang="de-DE"/>
+            <a:endParaRPr lang="de-DE" dirty="0"/>
           </a:p>
         </p:txBody>
       </p:sp>
@@ -4251,7 +4256,7 @@
           </a:bodyPr>
           <a:lstStyle/>
           <a:p>
-            <a:endParaRPr lang="de-DE"/>
+            <a:endParaRPr lang="de-DE" dirty="0"/>
           </a:p>
         </p:txBody>
       </p:sp>
@@ -4320,7 +4325,7 @@
           </a:bodyPr>
           <a:lstStyle/>
           <a:p>
-            <a:endParaRPr lang="de-DE"/>
+            <a:endParaRPr lang="de-DE" dirty="0"/>
           </a:p>
         </p:txBody>
       </p:sp>
@@ -4389,7 +4394,7 @@
           </a:bodyPr>
           <a:lstStyle/>
           <a:p>
-            <a:endParaRPr lang="de-DE"/>
+            <a:endParaRPr lang="de-DE" dirty="0"/>
           </a:p>
         </p:txBody>
       </p:sp>
@@ -4683,7 +4688,7 @@
           </a:bodyPr>
           <a:lstStyle/>
           <a:p>
-            <a:endParaRPr lang="de-DE"/>
+            <a:endParaRPr lang="de-DE" dirty="0"/>
           </a:p>
         </p:txBody>
       </p:sp>
@@ -4919,7 +4924,7 @@
           </a:bodyPr>
           <a:lstStyle/>
           <a:p>
-            <a:endParaRPr lang="de-DE"/>
+            <a:endParaRPr lang="de-DE" dirty="0"/>
           </a:p>
         </p:txBody>
       </p:sp>
@@ -6067,21 +6072,7 @@
                 <a:latin typeface="Arial" panose="020B0604020202020204" pitchFamily="34" charset="0"/>
                 <a:sym typeface="Wingdings" panose="05000000000000000000" pitchFamily="2" charset="2"/>
               </a:rPr>
-              <a:t> </a:t>
-            </a:r>
-            <a:r>
-              <a:rPr lang="de-DE" altLang="de-DE" sz="1200" dirty="0" err="1">
-                <a:latin typeface="Arial" panose="020B0604020202020204" pitchFamily="34" charset="0"/>
-                <a:sym typeface="Wingdings" panose="05000000000000000000" pitchFamily="2" charset="2"/>
-              </a:rPr>
-              <a:t>low</a:t>
-            </a:r>
-            <a:r>
-              <a:rPr lang="de-DE" altLang="de-DE" sz="1200" dirty="0">
-                <a:latin typeface="Arial" panose="020B0604020202020204" pitchFamily="34" charset="0"/>
-                <a:sym typeface="Wingdings" panose="05000000000000000000" pitchFamily="2" charset="2"/>
-              </a:rPr>
-              <a:t>-level)</a:t>
+              <a:t> low-level)</a:t>
             </a:r>
             <a:endParaRPr kumimoji="0" lang="de-DE" altLang="de-DE" sz="1200" b="0" i="0" u="none" strike="noStrike" cap="none" normalizeH="0" baseline="0" dirty="0">
               <a:ln>
@@ -6270,10 +6261,9 @@
           <a:lstStyle/>
           <a:p>
             <a:r>
-              <a:rPr lang="de-DE" dirty="0" err="1"/>
+              <a:rPr lang="de-DE" dirty="0"/>
               <a:t>StartUp</a:t>
             </a:r>
-            <a:endParaRPr lang="de-DE" dirty="0"/>
           </a:p>
         </p:txBody>
       </p:sp>
@@ -6333,18 +6323,9 @@
               <a:buChar char="•"/>
             </a:pPr>
             <a:r>
-              <a:rPr lang="de-DE" dirty="0" err="1"/>
-              <a:t>Init</a:t>
-            </a:r>
-            <a:r>
               <a:rPr lang="de-DE" dirty="0"/>
-              <a:t> </a:t>
-            </a:r>
-            <a:r>
-              <a:rPr lang="de-DE" dirty="0" err="1"/>
-              <a:t>windows</a:t>
-            </a:r>
-            <a:endParaRPr lang="de-DE" dirty="0"/>
+              <a:t>Init windows</a:t>
+            </a:r>
           </a:p>
           <a:p>
             <a:pPr marL="1200150" lvl="2" indent="-285750">
@@ -6362,12 +6343,8 @@
               <a:buChar char="•"/>
             </a:pPr>
             <a:r>
-              <a:rPr lang="de-DE" dirty="0" err="1"/>
-              <a:t>Init</a:t>
-            </a:r>
-            <a:r>
               <a:rPr lang="de-DE" dirty="0"/>
-              <a:t> Zeichen Objekte</a:t>
+              <a:t>Init Zeichen Objekte</a:t>
             </a:r>
           </a:p>
           <a:p>
@@ -6492,12 +6469,8 @@
               <a:buChar char="•"/>
             </a:pPr>
             <a:r>
-              <a:rPr lang="de-DE" sz="1600" dirty="0" err="1"/>
-              <a:t>Init</a:t>
-            </a:r>
-            <a:r>
               <a:rPr lang="de-DE" sz="1600" dirty="0"/>
-              <a:t> Sensoren</a:t>
+              <a:t>Init Sensoren</a:t>
             </a:r>
           </a:p>
           <a:p>
@@ -6506,18 +6479,9 @@
               <a:buChar char="•"/>
             </a:pPr>
             <a:r>
-              <a:rPr lang="de-DE" sz="1600" dirty="0" err="1"/>
-              <a:t>Init</a:t>
-            </a:r>
-            <a:r>
               <a:rPr lang="de-DE" sz="1600" dirty="0"/>
-              <a:t> </a:t>
-            </a:r>
-            <a:r>
-              <a:rPr lang="de-DE" sz="1600" dirty="0" err="1"/>
-              <a:t>RealMower</a:t>
-            </a:r>
-            <a:endParaRPr lang="de-DE" sz="1600" dirty="0"/>
+              <a:t>Init RealMower</a:t>
+            </a:r>
           </a:p>
           <a:p>
             <a:pPr marL="800100" lvl="1" indent="-342900">
@@ -6578,12 +6542,8 @@
               <a:buChar char="•"/>
             </a:pPr>
             <a:r>
-              <a:rPr lang="de-DE" dirty="0" err="1"/>
-              <a:t>Init</a:t>
-            </a:r>
-            <a:r>
               <a:rPr lang="de-DE" dirty="0"/>
-              <a:t> abstrakte Objekte (Mäher Objekt von Real/Simulation)</a:t>
+              <a:t>Init abstrakte Objekte (Mäher Objekt von Real/Simulation)</a:t>
             </a:r>
           </a:p>
           <a:p>
@@ -6602,10 +6562,9 @@
               <a:buChar char="•"/>
             </a:pPr>
             <a:r>
-              <a:rPr lang="de-DE" sz="1600" dirty="0" err="1"/>
+              <a:rPr lang="de-DE" sz="1600" dirty="0"/>
               <a:t>Map</a:t>
             </a:r>
-            <a:endParaRPr lang="de-DE" sz="1600" dirty="0"/>
           </a:p>
         </p:txBody>
       </p:sp>
@@ -6653,8 +6612,8 @@
         </p:nvSpPr>
         <p:spPr>
           <a:xfrm>
-            <a:off x="4130040" y="3006332"/>
-            <a:ext cx="3770376" cy="872768"/>
+            <a:off x="4130040" y="3815576"/>
+            <a:ext cx="6074664" cy="2402344"/>
           </a:xfrm>
           <a:prstGeom prst="round2DiagRect">
             <a:avLst/>
@@ -6700,8 +6659,8 @@
         </p:nvSpPr>
         <p:spPr>
           <a:xfrm>
-            <a:off x="347472" y="3006332"/>
-            <a:ext cx="3145536" cy="872768"/>
+            <a:off x="165683" y="3997085"/>
+            <a:ext cx="3623447" cy="2402344"/>
           </a:xfrm>
           <a:prstGeom prst="round2DiagRect">
             <a:avLst/>
@@ -6747,7 +6706,7 @@
         <p:spPr>
           <a:xfrm>
             <a:off x="466344" y="1353312"/>
-            <a:ext cx="6281928" cy="1078992"/>
+            <a:ext cx="6281928" cy="2297640"/>
           </a:xfrm>
           <a:prstGeom prst="round2DiagRect">
             <a:avLst/>
@@ -6794,7 +6753,12 @@
             <p:ph type="title"/>
           </p:nvPr>
         </p:nvSpPr>
-        <p:spPr/>
+        <p:spPr>
+          <a:xfrm>
+            <a:off x="838200" y="365125"/>
+            <a:ext cx="10515600" cy="712809"/>
+          </a:xfrm>
+        </p:spPr>
         <p:txBody>
           <a:bodyPr/>
           <a:lstStyle/>
@@ -6820,8 +6784,8 @@
         </p:nvSpPr>
         <p:spPr>
           <a:xfrm>
-            <a:off x="2554224" y="1726788"/>
-            <a:ext cx="2279904" cy="438912"/>
+            <a:off x="2563368" y="1417640"/>
+            <a:ext cx="2279904" cy="716704"/>
           </a:xfrm>
           <a:prstGeom prst="rect">
             <a:avLst/>
@@ -6847,20 +6811,8 @@
           <a:p>
             <a:pPr algn="ctr"/>
             <a:r>
-              <a:rPr lang="de-DE" dirty="0" err="1"/>
-              <a:t>Mower</a:t>
-            </a:r>
-            <a:r>
               <a:rPr lang="de-DE" dirty="0"/>
-              <a:t> (</a:t>
-            </a:r>
-            <a:r>
-              <a:rPr lang="de-DE" dirty="0" err="1"/>
-              <a:t>abstract</a:t>
-            </a:r>
-            <a:r>
-              <a:rPr lang="de-DE" dirty="0"/>
-              <a:t>)</a:t>
+              <a:t>Mower (abstract)</a:t>
             </a:r>
           </a:p>
         </p:txBody>
@@ -6879,8 +6831,8 @@
         </p:nvSpPr>
         <p:spPr>
           <a:xfrm>
-            <a:off x="4233672" y="3154680"/>
-            <a:ext cx="2279904" cy="438912"/>
+            <a:off x="4404360" y="4104596"/>
+            <a:ext cx="2279904" cy="354588"/>
           </a:xfrm>
           <a:prstGeom prst="rect">
             <a:avLst/>
@@ -6906,10 +6858,9 @@
           <a:p>
             <a:pPr algn="ctr"/>
             <a:r>
-              <a:rPr lang="de-DE" dirty="0" err="1"/>
+              <a:rPr lang="de-DE" dirty="0"/>
               <a:t>SimulationMower</a:t>
             </a:r>
-            <a:endParaRPr lang="de-DE" dirty="0"/>
           </a:p>
         </p:txBody>
       </p:sp>
@@ -6927,8 +6878,8 @@
         </p:nvSpPr>
         <p:spPr>
           <a:xfrm>
-            <a:off x="1066800" y="3191256"/>
-            <a:ext cx="2279904" cy="438912"/>
+            <a:off x="1168316" y="4096512"/>
+            <a:ext cx="2279904" cy="384048"/>
           </a:xfrm>
           <a:prstGeom prst="rect">
             <a:avLst/>
@@ -6954,10 +6905,9 @@
           <a:p>
             <a:pPr algn="ctr"/>
             <a:r>
-              <a:rPr lang="de-DE" dirty="0" err="1"/>
+              <a:rPr lang="de-DE" dirty="0"/>
               <a:t>RealMower</a:t>
             </a:r>
-            <a:endParaRPr lang="de-DE" dirty="0"/>
           </a:p>
         </p:txBody>
       </p:sp>
@@ -6975,8 +6925,8 @@
         </p:nvSpPr>
         <p:spPr>
           <a:xfrm rot="12256186">
-            <a:off x="2524047" y="2140833"/>
-            <a:ext cx="269799" cy="1107942"/>
+            <a:off x="1991801" y="3634954"/>
+            <a:ext cx="269799" cy="471277"/>
           </a:xfrm>
           <a:prstGeom prst="downArrow">
             <a:avLst>
@@ -7006,7 +6956,7 @@
           <a:lstStyle/>
           <a:p>
             <a:pPr algn="ctr"/>
-            <a:endParaRPr lang="de-DE"/>
+            <a:endParaRPr lang="de-DE" dirty="0"/>
           </a:p>
         </p:txBody>
       </p:sp>
@@ -7024,8 +6974,8 @@
         </p:nvSpPr>
         <p:spPr>
           <a:xfrm rot="9078292">
-            <a:off x="4483094" y="2123185"/>
-            <a:ext cx="269799" cy="1107942"/>
+            <a:off x="5245611" y="3634030"/>
+            <a:ext cx="269799" cy="470973"/>
           </a:xfrm>
           <a:prstGeom prst="downArrow">
             <a:avLst>
@@ -7055,7 +7005,201 @@
           <a:lstStyle/>
           <a:p>
             <a:pPr algn="ctr"/>
-            <a:endParaRPr lang="de-DE"/>
+            <a:endParaRPr lang="de-DE" dirty="0"/>
+          </a:p>
+        </p:txBody>
+      </p:sp>
+      <p:sp>
+        <p:nvSpPr>
+          <p:cNvPr id="3" name="Textfeld 2">
+            <a:extLst>
+              <a:ext uri="{FF2B5EF4-FFF2-40B4-BE49-F238E27FC236}">
+                <a16:creationId xmlns:a16="http://schemas.microsoft.com/office/drawing/2014/main" id="{CB56D356-0A4A-40B4-8FFB-FF1F0A14E0BD}"/>
+              </a:ext>
+            </a:extLst>
+          </p:cNvPr>
+          <p:cNvSpPr txBox="1"/>
+          <p:nvPr/>
+        </p:nvSpPr>
+        <p:spPr>
+          <a:xfrm>
+            <a:off x="2563368" y="2188891"/>
+            <a:ext cx="3340608" cy="1200329"/>
+          </a:xfrm>
+          <a:prstGeom prst="rect">
+            <a:avLst/>
+          </a:prstGeom>
+          <a:noFill/>
+        </p:spPr>
+        <p:txBody>
+          <a:bodyPr wrap="square" rtlCol="0">
+            <a:spAutoFit/>
+          </a:bodyPr>
+          <a:lstStyle/>
+          <a:p>
+            <a:pPr marL="285750" indent="-285750">
+              <a:buFont typeface="Arial" panose="020B0604020202020204" pitchFamily="34" charset="0"/>
+              <a:buChar char="•"/>
+            </a:pPr>
+            <a:r>
+              <a:rPr lang="de-DE" sz="1200" dirty="0"/>
+              <a:t>Rotate_wheel(wheel, deg) (abstract)</a:t>
+            </a:r>
+          </a:p>
+          <a:p>
+            <a:pPr marL="285750" indent="-285750">
+              <a:buFont typeface="Arial" panose="020B0604020202020204" pitchFamily="34" charset="0"/>
+              <a:buChar char="•"/>
+            </a:pPr>
+            <a:r>
+              <a:rPr lang="de-DE" sz="1200" dirty="0"/>
+              <a:t>Get_sensor_data() (abstract)</a:t>
+            </a:r>
+          </a:p>
+          <a:p>
+            <a:pPr marL="285750" indent="-285750">
+              <a:buFont typeface="Arial" panose="020B0604020202020204" pitchFamily="34" charset="0"/>
+              <a:buChar char="•"/>
+            </a:pPr>
+            <a:r>
+              <a:rPr lang="de-DE" sz="1200" dirty="0"/>
+              <a:t>Turn_mower_knife_on/off() (abstract?)</a:t>
+            </a:r>
+          </a:p>
+          <a:p>
+            <a:pPr marL="285750" indent="-285750">
+              <a:buFont typeface="Arial" panose="020B0604020202020204" pitchFamily="34" charset="0"/>
+              <a:buChar char="•"/>
+            </a:pPr>
+            <a:r>
+              <a:rPr lang="de-DE" sz="1200" dirty="0"/>
+              <a:t>Drive_forward(distance)</a:t>
+            </a:r>
+          </a:p>
+          <a:p>
+            <a:pPr marL="285750" indent="-285750">
+              <a:buFont typeface="Arial" panose="020B0604020202020204" pitchFamily="34" charset="0"/>
+              <a:buChar char="•"/>
+            </a:pPr>
+            <a:r>
+              <a:rPr lang="de-DE" sz="1200" dirty="0"/>
+              <a:t>Turn(side, deg)</a:t>
+            </a:r>
+          </a:p>
+          <a:p>
+            <a:pPr marL="285750" indent="-285750">
+              <a:buFont typeface="Arial" panose="020B0604020202020204" pitchFamily="34" charset="0"/>
+              <a:buChar char="•"/>
+            </a:pPr>
+            <a:endParaRPr lang="de-DE" sz="1200" dirty="0"/>
+          </a:p>
+        </p:txBody>
+      </p:sp>
+      <p:sp>
+        <p:nvSpPr>
+          <p:cNvPr id="12" name="Textfeld 11">
+            <a:extLst>
+              <a:ext uri="{FF2B5EF4-FFF2-40B4-BE49-F238E27FC236}">
+                <a16:creationId xmlns:a16="http://schemas.microsoft.com/office/drawing/2014/main" id="{FFAA38D8-25B7-40B3-A5B5-BF66984673C3}"/>
+              </a:ext>
+            </a:extLst>
+          </p:cNvPr>
+          <p:cNvSpPr txBox="1"/>
+          <p:nvPr/>
+        </p:nvSpPr>
+        <p:spPr>
+          <a:xfrm>
+            <a:off x="1168316" y="4736592"/>
+            <a:ext cx="2187532" cy="461665"/>
+          </a:xfrm>
+          <a:prstGeom prst="rect">
+            <a:avLst/>
+          </a:prstGeom>
+          <a:noFill/>
+        </p:spPr>
+        <p:txBody>
+          <a:bodyPr wrap="square" rtlCol="0">
+            <a:spAutoFit/>
+          </a:bodyPr>
+          <a:lstStyle/>
+          <a:p>
+            <a:pPr marL="171450" indent="-171450">
+              <a:buFont typeface="Arial" panose="020B0604020202020204" pitchFamily="34" charset="0"/>
+              <a:buChar char="•"/>
+            </a:pPr>
+            <a:r>
+              <a:rPr lang="de-DE" sz="1200" dirty="0"/>
+              <a:t>Rotate_wheel(wheel, deg)</a:t>
+            </a:r>
+          </a:p>
+          <a:p>
+            <a:pPr marL="171450" indent="-171450">
+              <a:buFont typeface="Arial" panose="020B0604020202020204" pitchFamily="34" charset="0"/>
+              <a:buChar char="•"/>
+            </a:pPr>
+            <a:r>
+              <a:rPr lang="de-DE" sz="1200" dirty="0"/>
+              <a:t>Get_sensor_data()</a:t>
+            </a:r>
+          </a:p>
+        </p:txBody>
+      </p:sp>
+      <p:sp>
+        <p:nvSpPr>
+          <p:cNvPr id="13" name="Textfeld 12">
+            <a:extLst>
+              <a:ext uri="{FF2B5EF4-FFF2-40B4-BE49-F238E27FC236}">
+                <a16:creationId xmlns:a16="http://schemas.microsoft.com/office/drawing/2014/main" id="{B1EDC219-33F8-47DA-B39E-AD9744D48A84}"/>
+              </a:ext>
+            </a:extLst>
+          </p:cNvPr>
+          <p:cNvSpPr txBox="1"/>
+          <p:nvPr/>
+        </p:nvSpPr>
+        <p:spPr>
+          <a:xfrm>
+            <a:off x="4404360" y="4718304"/>
+            <a:ext cx="2069592" cy="646331"/>
+          </a:xfrm>
+          <a:prstGeom prst="rect">
+            <a:avLst/>
+          </a:prstGeom>
+          <a:noFill/>
+        </p:spPr>
+        <p:txBody>
+          <a:bodyPr wrap="square" rtlCol="0">
+            <a:spAutoFit/>
+          </a:bodyPr>
+          <a:lstStyle/>
+          <a:p>
+            <a:pPr marL="171450" indent="-171450">
+              <a:buFont typeface="Arial" panose="020B0604020202020204" pitchFamily="34" charset="0"/>
+              <a:buChar char="•"/>
+            </a:pPr>
+            <a:r>
+              <a:rPr lang="de-DE" sz="1200" dirty="0"/>
+              <a:t>Rotate_wheel(wheel, deg)</a:t>
+            </a:r>
+          </a:p>
+          <a:p>
+            <a:pPr marL="171450" indent="-171450">
+              <a:buFont typeface="Arial" panose="020B0604020202020204" pitchFamily="34" charset="0"/>
+              <a:buChar char="•"/>
+            </a:pPr>
+            <a:r>
+              <a:rPr lang="de-DE" sz="1200" dirty="0"/>
+              <a:t>Get_sensor_data()</a:t>
+            </a:r>
+          </a:p>
+          <a:p>
+            <a:pPr marL="171450" indent="-171450">
+              <a:buFont typeface="Arial" panose="020B0604020202020204" pitchFamily="34" charset="0"/>
+              <a:buChar char="•"/>
+            </a:pPr>
+            <a:r>
+              <a:rPr lang="de-DE" sz="1200" dirty="0"/>
+              <a:t>Render</a:t>
+            </a:r>
           </a:p>
         </p:txBody>
       </p:sp>

</xml_diff>

<commit_message>
Extend documentation with mower sizes + mower rotation
</commit_message>
<xml_diff>
--- a/Documents/Diagramme.pptx
+++ b/Documents/Diagramme.pptx
@@ -9,6 +9,8 @@
     <p:sldId id="257" r:id="rId3"/>
     <p:sldId id="258" r:id="rId4"/>
     <p:sldId id="259" r:id="rId5"/>
+    <p:sldId id="260" r:id="rId6"/>
+    <p:sldId id="261" r:id="rId7"/>
   </p:sldIdLst>
   <p:sldSz cx="12192000" cy="6858000"/>
   <p:notesSz cx="6858000" cy="9144000"/>
@@ -262,7 +264,7 @@
           <a:p>
             <a:fld id="{B864E9F5-10DA-45DB-90FA-5425A45880BA}" type="datetimeFigureOut">
               <a:rPr lang="de-DE" smtClean="0"/>
-              <a:t>04.01.2019</a:t>
+              <a:t>17.01.2019</a:t>
             </a:fld>
             <a:endParaRPr lang="de-DE" dirty="0"/>
           </a:p>
@@ -460,7 +462,7 @@
           <a:p>
             <a:fld id="{B864E9F5-10DA-45DB-90FA-5425A45880BA}" type="datetimeFigureOut">
               <a:rPr lang="de-DE" smtClean="0"/>
-              <a:t>04.01.2019</a:t>
+              <a:t>17.01.2019</a:t>
             </a:fld>
             <a:endParaRPr lang="de-DE" dirty="0"/>
           </a:p>
@@ -668,7 +670,7 @@
           <a:p>
             <a:fld id="{B864E9F5-10DA-45DB-90FA-5425A45880BA}" type="datetimeFigureOut">
               <a:rPr lang="de-DE" smtClean="0"/>
-              <a:t>04.01.2019</a:t>
+              <a:t>17.01.2019</a:t>
             </a:fld>
             <a:endParaRPr lang="de-DE" dirty="0"/>
           </a:p>
@@ -866,7 +868,7 @@
           <a:p>
             <a:fld id="{B864E9F5-10DA-45DB-90FA-5425A45880BA}" type="datetimeFigureOut">
               <a:rPr lang="de-DE" smtClean="0"/>
-              <a:t>04.01.2019</a:t>
+              <a:t>17.01.2019</a:t>
             </a:fld>
             <a:endParaRPr lang="de-DE" dirty="0"/>
           </a:p>
@@ -1141,7 +1143,7 @@
           <a:p>
             <a:fld id="{B864E9F5-10DA-45DB-90FA-5425A45880BA}" type="datetimeFigureOut">
               <a:rPr lang="de-DE" smtClean="0"/>
-              <a:t>04.01.2019</a:t>
+              <a:t>17.01.2019</a:t>
             </a:fld>
             <a:endParaRPr lang="de-DE" dirty="0"/>
           </a:p>
@@ -1406,7 +1408,7 @@
           <a:p>
             <a:fld id="{B864E9F5-10DA-45DB-90FA-5425A45880BA}" type="datetimeFigureOut">
               <a:rPr lang="de-DE" smtClean="0"/>
-              <a:t>04.01.2019</a:t>
+              <a:t>17.01.2019</a:t>
             </a:fld>
             <a:endParaRPr lang="de-DE" dirty="0"/>
           </a:p>
@@ -1818,7 +1820,7 @@
           <a:p>
             <a:fld id="{B864E9F5-10DA-45DB-90FA-5425A45880BA}" type="datetimeFigureOut">
               <a:rPr lang="de-DE" smtClean="0"/>
-              <a:t>04.01.2019</a:t>
+              <a:t>17.01.2019</a:t>
             </a:fld>
             <a:endParaRPr lang="de-DE" dirty="0"/>
           </a:p>
@@ -1959,7 +1961,7 @@
           <a:p>
             <a:fld id="{B864E9F5-10DA-45DB-90FA-5425A45880BA}" type="datetimeFigureOut">
               <a:rPr lang="de-DE" smtClean="0"/>
-              <a:t>04.01.2019</a:t>
+              <a:t>17.01.2019</a:t>
             </a:fld>
             <a:endParaRPr lang="de-DE" dirty="0"/>
           </a:p>
@@ -2072,7 +2074,7 @@
           <a:p>
             <a:fld id="{B864E9F5-10DA-45DB-90FA-5425A45880BA}" type="datetimeFigureOut">
               <a:rPr lang="de-DE" smtClean="0"/>
-              <a:t>04.01.2019</a:t>
+              <a:t>17.01.2019</a:t>
             </a:fld>
             <a:endParaRPr lang="de-DE" dirty="0"/>
           </a:p>
@@ -2383,7 +2385,7 @@
           <a:p>
             <a:fld id="{B864E9F5-10DA-45DB-90FA-5425A45880BA}" type="datetimeFigureOut">
               <a:rPr lang="de-DE" smtClean="0"/>
-              <a:t>04.01.2019</a:t>
+              <a:t>17.01.2019</a:t>
             </a:fld>
             <a:endParaRPr lang="de-DE" dirty="0"/>
           </a:p>
@@ -2671,7 +2673,7 @@
           <a:p>
             <a:fld id="{B864E9F5-10DA-45DB-90FA-5425A45880BA}" type="datetimeFigureOut">
               <a:rPr lang="de-DE" smtClean="0"/>
-              <a:t>04.01.2019</a:t>
+              <a:t>17.01.2019</a:t>
             </a:fld>
             <a:endParaRPr lang="de-DE" dirty="0"/>
           </a:p>
@@ -2912,7 +2914,7 @@
           <a:p>
             <a:fld id="{B864E9F5-10DA-45DB-90FA-5425A45880BA}" type="datetimeFigureOut">
               <a:rPr lang="de-DE" smtClean="0"/>
-              <a:t>04.01.2019</a:t>
+              <a:t>17.01.2019</a:t>
             </a:fld>
             <a:endParaRPr lang="de-DE" dirty="0"/>
           </a:p>
@@ -7235,6 +7237,1374 @@
 </p:sld>
 </file>
 
+<file path=ppt/slides/slide5.xml><?xml version="1.0" encoding="utf-8"?>
+<p:sld xmlns:a="http://schemas.openxmlformats.org/drawingml/2006/main" xmlns:r="http://schemas.openxmlformats.org/officeDocument/2006/relationships" xmlns:p="http://schemas.openxmlformats.org/presentationml/2006/main">
+  <p:cSld>
+    <p:spTree>
+      <p:nvGrpSpPr>
+        <p:cNvPr id="1" name=""/>
+        <p:cNvGrpSpPr/>
+        <p:nvPr/>
+      </p:nvGrpSpPr>
+      <p:grpSpPr>
+        <a:xfrm>
+          <a:off x="0" y="0"/>
+          <a:ext cx="0" cy="0"/>
+          <a:chOff x="0" y="0"/>
+          <a:chExt cx="0" cy="0"/>
+        </a:xfrm>
+      </p:grpSpPr>
+      <p:sp>
+        <p:nvSpPr>
+          <p:cNvPr id="2" name="Titel 1">
+            <a:extLst>
+              <a:ext uri="{FF2B5EF4-FFF2-40B4-BE49-F238E27FC236}">
+                <a16:creationId xmlns:a16="http://schemas.microsoft.com/office/drawing/2014/main" id="{188BF901-F077-4A73-BD59-042B4981BCE4}"/>
+              </a:ext>
+            </a:extLst>
+          </p:cNvPr>
+          <p:cNvSpPr>
+            <a:spLocks noGrp="1"/>
+          </p:cNvSpPr>
+          <p:nvPr>
+            <p:ph type="title"/>
+          </p:nvPr>
+        </p:nvSpPr>
+        <p:spPr>
+          <a:xfrm>
+            <a:off x="838200" y="365125"/>
+            <a:ext cx="10515600" cy="613283"/>
+          </a:xfrm>
+        </p:spPr>
+        <p:txBody>
+          <a:bodyPr>
+            <a:normAutofit fontScale="90000"/>
+          </a:bodyPr>
+          <a:lstStyle/>
+          <a:p>
+            <a:r>
+              <a:rPr lang="de-DE" dirty="0" err="1"/>
+              <a:t>Mower</a:t>
+            </a:r>
+            <a:r>
+              <a:rPr lang="de-DE" dirty="0"/>
+              <a:t> - Maße</a:t>
+            </a:r>
+          </a:p>
+        </p:txBody>
+      </p:sp>
+      <p:sp>
+        <p:nvSpPr>
+          <p:cNvPr id="4" name="Rechteck 3">
+            <a:extLst>
+              <a:ext uri="{FF2B5EF4-FFF2-40B4-BE49-F238E27FC236}">
+                <a16:creationId xmlns:a16="http://schemas.microsoft.com/office/drawing/2014/main" id="{B6380F15-C4A0-484A-BBC4-889DED59E036}"/>
+              </a:ext>
+            </a:extLst>
+          </p:cNvPr>
+          <p:cNvSpPr/>
+          <p:nvPr/>
+        </p:nvSpPr>
+        <p:spPr>
+          <a:xfrm>
+            <a:off x="4462272" y="1865376"/>
+            <a:ext cx="2176272" cy="3794760"/>
+          </a:xfrm>
+          <a:prstGeom prst="rect">
+            <a:avLst/>
+          </a:prstGeom>
+        </p:spPr>
+        <p:style>
+          <a:lnRef idx="2">
+            <a:schemeClr val="accent1">
+              <a:shade val="50000"/>
+            </a:schemeClr>
+          </a:lnRef>
+          <a:fillRef idx="1">
+            <a:schemeClr val="accent1"/>
+          </a:fillRef>
+          <a:effectRef idx="0">
+            <a:schemeClr val="accent1"/>
+          </a:effectRef>
+          <a:fontRef idx="minor">
+            <a:schemeClr val="lt1"/>
+          </a:fontRef>
+        </p:style>
+        <p:txBody>
+          <a:bodyPr rtlCol="0" anchor="ctr"/>
+          <a:lstStyle/>
+          <a:p>
+            <a:pPr algn="ctr"/>
+            <a:endParaRPr lang="de-DE"/>
+          </a:p>
+        </p:txBody>
+      </p:sp>
+      <p:sp>
+        <p:nvSpPr>
+          <p:cNvPr id="5" name="Rechteck 4">
+            <a:extLst>
+              <a:ext uri="{FF2B5EF4-FFF2-40B4-BE49-F238E27FC236}">
+                <a16:creationId xmlns:a16="http://schemas.microsoft.com/office/drawing/2014/main" id="{76F96DB0-4F9A-4E6C-AFEC-F43098FF42C6}"/>
+              </a:ext>
+            </a:extLst>
+          </p:cNvPr>
+          <p:cNvSpPr/>
+          <p:nvPr/>
+        </p:nvSpPr>
+        <p:spPr>
+          <a:xfrm>
+            <a:off x="6638544" y="3259836"/>
+            <a:ext cx="530352" cy="1005840"/>
+          </a:xfrm>
+          <a:prstGeom prst="rect">
+            <a:avLst/>
+          </a:prstGeom>
+        </p:spPr>
+        <p:style>
+          <a:lnRef idx="2">
+            <a:schemeClr val="accent1">
+              <a:shade val="50000"/>
+            </a:schemeClr>
+          </a:lnRef>
+          <a:fillRef idx="1">
+            <a:schemeClr val="accent1"/>
+          </a:fillRef>
+          <a:effectRef idx="0">
+            <a:schemeClr val="accent1"/>
+          </a:effectRef>
+          <a:fontRef idx="minor">
+            <a:schemeClr val="lt1"/>
+          </a:fontRef>
+        </p:style>
+        <p:txBody>
+          <a:bodyPr rtlCol="0" anchor="ctr"/>
+          <a:lstStyle/>
+          <a:p>
+            <a:pPr algn="ctr"/>
+            <a:endParaRPr lang="de-DE"/>
+          </a:p>
+        </p:txBody>
+      </p:sp>
+      <p:sp>
+        <p:nvSpPr>
+          <p:cNvPr id="7" name="Rechteck 6">
+            <a:extLst>
+              <a:ext uri="{FF2B5EF4-FFF2-40B4-BE49-F238E27FC236}">
+                <a16:creationId xmlns:a16="http://schemas.microsoft.com/office/drawing/2014/main" id="{895FFB49-7AD7-4B39-9635-244291C48A43}"/>
+              </a:ext>
+            </a:extLst>
+          </p:cNvPr>
+          <p:cNvSpPr/>
+          <p:nvPr/>
+        </p:nvSpPr>
+        <p:spPr>
+          <a:xfrm>
+            <a:off x="3931920" y="3259836"/>
+            <a:ext cx="530352" cy="1005840"/>
+          </a:xfrm>
+          <a:prstGeom prst="rect">
+            <a:avLst/>
+          </a:prstGeom>
+        </p:spPr>
+        <p:style>
+          <a:lnRef idx="2">
+            <a:schemeClr val="accent1">
+              <a:shade val="50000"/>
+            </a:schemeClr>
+          </a:lnRef>
+          <a:fillRef idx="1">
+            <a:schemeClr val="accent1"/>
+          </a:fillRef>
+          <a:effectRef idx="0">
+            <a:schemeClr val="accent1"/>
+          </a:effectRef>
+          <a:fontRef idx="minor">
+            <a:schemeClr val="lt1"/>
+          </a:fontRef>
+        </p:style>
+        <p:txBody>
+          <a:bodyPr rtlCol="0" anchor="ctr"/>
+          <a:lstStyle/>
+          <a:p>
+            <a:pPr algn="ctr"/>
+            <a:endParaRPr lang="de-DE"/>
+          </a:p>
+        </p:txBody>
+      </p:sp>
+      <p:sp>
+        <p:nvSpPr>
+          <p:cNvPr id="8" name="Gleichschenkliges Dreieck 7">
+            <a:extLst>
+              <a:ext uri="{FF2B5EF4-FFF2-40B4-BE49-F238E27FC236}">
+                <a16:creationId xmlns:a16="http://schemas.microsoft.com/office/drawing/2014/main" id="{0A2ACC73-1319-4656-82F4-37BB03FA35D9}"/>
+              </a:ext>
+            </a:extLst>
+          </p:cNvPr>
+          <p:cNvSpPr/>
+          <p:nvPr/>
+        </p:nvSpPr>
+        <p:spPr>
+          <a:xfrm>
+            <a:off x="5189220" y="1865376"/>
+            <a:ext cx="722376" cy="539496"/>
+          </a:xfrm>
+          <a:prstGeom prst="triangle">
+            <a:avLst/>
+          </a:prstGeom>
+        </p:spPr>
+        <p:style>
+          <a:lnRef idx="2">
+            <a:schemeClr val="accent3">
+              <a:shade val="50000"/>
+            </a:schemeClr>
+          </a:lnRef>
+          <a:fillRef idx="1">
+            <a:schemeClr val="accent3"/>
+          </a:fillRef>
+          <a:effectRef idx="0">
+            <a:schemeClr val="accent3"/>
+          </a:effectRef>
+          <a:fontRef idx="minor">
+            <a:schemeClr val="lt1"/>
+          </a:fontRef>
+        </p:style>
+        <p:txBody>
+          <a:bodyPr rtlCol="0" anchor="ctr"/>
+          <a:lstStyle/>
+          <a:p>
+            <a:pPr algn="ctr"/>
+            <a:endParaRPr lang="de-DE"/>
+          </a:p>
+        </p:txBody>
+      </p:sp>
+      <p:cxnSp>
+        <p:nvCxnSpPr>
+          <p:cNvPr id="10" name="Gerade Verbindung mit Pfeil 9">
+            <a:extLst>
+              <a:ext uri="{FF2B5EF4-FFF2-40B4-BE49-F238E27FC236}">
+                <a16:creationId xmlns:a16="http://schemas.microsoft.com/office/drawing/2014/main" id="{CD01582A-CFFC-4778-80C6-7B1FB5E2FE2F}"/>
+              </a:ext>
+            </a:extLst>
+          </p:cNvPr>
+          <p:cNvCxnSpPr>
+            <a:cxnSpLocks/>
+          </p:cNvCxnSpPr>
+          <p:nvPr/>
+        </p:nvCxnSpPr>
+        <p:spPr>
+          <a:xfrm>
+            <a:off x="3931920" y="1407559"/>
+            <a:ext cx="3236976" cy="0"/>
+          </a:xfrm>
+          <a:prstGeom prst="straightConnector1">
+            <a:avLst/>
+          </a:prstGeom>
+          <a:ln>
+            <a:headEnd type="triangle"/>
+            <a:tailEnd type="triangle"/>
+          </a:ln>
+        </p:spPr>
+        <p:style>
+          <a:lnRef idx="1">
+            <a:schemeClr val="accent2"/>
+          </a:lnRef>
+          <a:fillRef idx="0">
+            <a:schemeClr val="accent2"/>
+          </a:fillRef>
+          <a:effectRef idx="0">
+            <a:schemeClr val="accent2"/>
+          </a:effectRef>
+          <a:fontRef idx="minor">
+            <a:schemeClr val="tx1"/>
+          </a:fontRef>
+        </p:style>
+      </p:cxnSp>
+      <p:cxnSp>
+        <p:nvCxnSpPr>
+          <p:cNvPr id="14" name="Gerade Verbindung mit Pfeil 13">
+            <a:extLst>
+              <a:ext uri="{FF2B5EF4-FFF2-40B4-BE49-F238E27FC236}">
+                <a16:creationId xmlns:a16="http://schemas.microsoft.com/office/drawing/2014/main" id="{25A36B83-3117-4EBB-8B44-A3F35F24379B}"/>
+              </a:ext>
+            </a:extLst>
+          </p:cNvPr>
+          <p:cNvCxnSpPr>
+            <a:cxnSpLocks/>
+          </p:cNvCxnSpPr>
+          <p:nvPr/>
+        </p:nvCxnSpPr>
+        <p:spPr>
+          <a:xfrm>
+            <a:off x="7572053" y="1865376"/>
+            <a:ext cx="1" cy="3794760"/>
+          </a:xfrm>
+          <a:prstGeom prst="straightConnector1">
+            <a:avLst/>
+          </a:prstGeom>
+          <a:ln>
+            <a:headEnd type="triangle"/>
+            <a:tailEnd type="triangle"/>
+          </a:ln>
+        </p:spPr>
+        <p:style>
+          <a:lnRef idx="1">
+            <a:schemeClr val="accent2"/>
+          </a:lnRef>
+          <a:fillRef idx="0">
+            <a:schemeClr val="accent2"/>
+          </a:fillRef>
+          <a:effectRef idx="0">
+            <a:schemeClr val="accent2"/>
+          </a:effectRef>
+          <a:fontRef idx="minor">
+            <a:schemeClr val="tx1"/>
+          </a:fontRef>
+        </p:style>
+      </p:cxnSp>
+      <p:cxnSp>
+        <p:nvCxnSpPr>
+          <p:cNvPr id="17" name="Gerade Verbindung mit Pfeil 16">
+            <a:extLst>
+              <a:ext uri="{FF2B5EF4-FFF2-40B4-BE49-F238E27FC236}">
+                <a16:creationId xmlns:a16="http://schemas.microsoft.com/office/drawing/2014/main" id="{42265691-1D4F-43D8-94E1-907C0B5E29A4}"/>
+              </a:ext>
+            </a:extLst>
+          </p:cNvPr>
+          <p:cNvCxnSpPr>
+            <a:cxnSpLocks/>
+          </p:cNvCxnSpPr>
+          <p:nvPr/>
+        </p:nvCxnSpPr>
+        <p:spPr>
+          <a:xfrm flipV="1">
+            <a:off x="3734759" y="3259836"/>
+            <a:ext cx="0" cy="502920"/>
+          </a:xfrm>
+          <a:prstGeom prst="straightConnector1">
+            <a:avLst/>
+          </a:prstGeom>
+          <a:ln>
+            <a:headEnd type="triangle"/>
+            <a:tailEnd type="triangle"/>
+          </a:ln>
+        </p:spPr>
+        <p:style>
+          <a:lnRef idx="1">
+            <a:schemeClr val="accent2"/>
+          </a:lnRef>
+          <a:fillRef idx="0">
+            <a:schemeClr val="accent2"/>
+          </a:fillRef>
+          <a:effectRef idx="0">
+            <a:schemeClr val="accent2"/>
+          </a:effectRef>
+          <a:fontRef idx="minor">
+            <a:schemeClr val="tx1"/>
+          </a:fontRef>
+        </p:style>
+      </p:cxnSp>
+      <p:cxnSp>
+        <p:nvCxnSpPr>
+          <p:cNvPr id="20" name="Gerade Verbindung mit Pfeil 19">
+            <a:extLst>
+              <a:ext uri="{FF2B5EF4-FFF2-40B4-BE49-F238E27FC236}">
+                <a16:creationId xmlns:a16="http://schemas.microsoft.com/office/drawing/2014/main" id="{DD304FA7-0B40-4A97-97C7-FCF51A173006}"/>
+              </a:ext>
+            </a:extLst>
+          </p:cNvPr>
+          <p:cNvCxnSpPr/>
+          <p:nvPr/>
+        </p:nvCxnSpPr>
+        <p:spPr>
+          <a:xfrm>
+            <a:off x="4197096" y="1762044"/>
+            <a:ext cx="2706624" cy="0"/>
+          </a:xfrm>
+          <a:prstGeom prst="straightConnector1">
+            <a:avLst/>
+          </a:prstGeom>
+          <a:ln>
+            <a:headEnd type="triangle"/>
+            <a:tailEnd type="triangle"/>
+          </a:ln>
+        </p:spPr>
+        <p:style>
+          <a:lnRef idx="1">
+            <a:schemeClr val="accent2"/>
+          </a:lnRef>
+          <a:fillRef idx="0">
+            <a:schemeClr val="accent2"/>
+          </a:fillRef>
+          <a:effectRef idx="0">
+            <a:schemeClr val="accent2"/>
+          </a:effectRef>
+          <a:fontRef idx="minor">
+            <a:schemeClr val="tx1"/>
+          </a:fontRef>
+        </p:style>
+      </p:cxnSp>
+      <p:sp>
+        <p:nvSpPr>
+          <p:cNvPr id="21" name="Textfeld 20">
+            <a:extLst>
+              <a:ext uri="{FF2B5EF4-FFF2-40B4-BE49-F238E27FC236}">
+                <a16:creationId xmlns:a16="http://schemas.microsoft.com/office/drawing/2014/main" id="{3A9315F0-1ACB-4014-814E-3BF7CAF6BA4B}"/>
+              </a:ext>
+            </a:extLst>
+          </p:cNvPr>
+          <p:cNvSpPr txBox="1"/>
+          <p:nvPr/>
+        </p:nvSpPr>
+        <p:spPr>
+          <a:xfrm>
+            <a:off x="4895362" y="1067858"/>
+            <a:ext cx="1200638" cy="369332"/>
+          </a:xfrm>
+          <a:prstGeom prst="rect">
+            <a:avLst/>
+          </a:prstGeom>
+          <a:noFill/>
+        </p:spPr>
+        <p:txBody>
+          <a:bodyPr wrap="square" rtlCol="0">
+            <a:spAutoFit/>
+          </a:bodyPr>
+          <a:lstStyle/>
+          <a:p>
+            <a:r>
+              <a:rPr lang="de-DE" dirty="0"/>
+              <a:t>WIDTH</a:t>
+            </a:r>
+          </a:p>
+        </p:txBody>
+      </p:sp>
+      <p:sp>
+        <p:nvSpPr>
+          <p:cNvPr id="22" name="Textfeld 21">
+            <a:extLst>
+              <a:ext uri="{FF2B5EF4-FFF2-40B4-BE49-F238E27FC236}">
+                <a16:creationId xmlns:a16="http://schemas.microsoft.com/office/drawing/2014/main" id="{DF865475-C292-4598-B9C6-543632E39D7C}"/>
+              </a:ext>
+            </a:extLst>
+          </p:cNvPr>
+          <p:cNvSpPr txBox="1"/>
+          <p:nvPr/>
+        </p:nvSpPr>
+        <p:spPr>
+          <a:xfrm rot="5400000">
+            <a:off x="7213519" y="3618371"/>
+            <a:ext cx="1086401" cy="369332"/>
+          </a:xfrm>
+          <a:prstGeom prst="rect">
+            <a:avLst/>
+          </a:prstGeom>
+          <a:noFill/>
+        </p:spPr>
+        <p:txBody>
+          <a:bodyPr wrap="square" rtlCol="0">
+            <a:spAutoFit/>
+          </a:bodyPr>
+          <a:lstStyle/>
+          <a:p>
+            <a:r>
+              <a:rPr lang="de-DE" dirty="0"/>
+              <a:t>LENGTH</a:t>
+            </a:r>
+          </a:p>
+        </p:txBody>
+      </p:sp>
+      <p:sp>
+        <p:nvSpPr>
+          <p:cNvPr id="23" name="Textfeld 22">
+            <a:extLst>
+              <a:ext uri="{FF2B5EF4-FFF2-40B4-BE49-F238E27FC236}">
+                <a16:creationId xmlns:a16="http://schemas.microsoft.com/office/drawing/2014/main" id="{8171CD11-ABEF-433C-A0D1-AAA6A5D80271}"/>
+              </a:ext>
+            </a:extLst>
+          </p:cNvPr>
+          <p:cNvSpPr txBox="1"/>
+          <p:nvPr/>
+        </p:nvSpPr>
+        <p:spPr>
+          <a:xfrm>
+            <a:off x="4676180" y="1444379"/>
+            <a:ext cx="1962364" cy="369332"/>
+          </a:xfrm>
+          <a:prstGeom prst="rect">
+            <a:avLst/>
+          </a:prstGeom>
+          <a:noFill/>
+        </p:spPr>
+        <p:txBody>
+          <a:bodyPr wrap="square" rtlCol="0">
+            <a:spAutoFit/>
+          </a:bodyPr>
+          <a:lstStyle/>
+          <a:p>
+            <a:r>
+              <a:rPr lang="de-DE" dirty="0"/>
+              <a:t>WHEEL_DISTANCE</a:t>
+            </a:r>
+          </a:p>
+        </p:txBody>
+      </p:sp>
+      <p:sp>
+        <p:nvSpPr>
+          <p:cNvPr id="24" name="Textfeld 23">
+            <a:extLst>
+              <a:ext uri="{FF2B5EF4-FFF2-40B4-BE49-F238E27FC236}">
+                <a16:creationId xmlns:a16="http://schemas.microsoft.com/office/drawing/2014/main" id="{C5A7D61F-A471-4598-B149-F568F9DFA684}"/>
+              </a:ext>
+            </a:extLst>
+          </p:cNvPr>
+          <p:cNvSpPr txBox="1"/>
+          <p:nvPr/>
+        </p:nvSpPr>
+        <p:spPr>
+          <a:xfrm rot="5400000">
+            <a:off x="2588291" y="3496142"/>
+            <a:ext cx="1797978" cy="369332"/>
+          </a:xfrm>
+          <a:prstGeom prst="rect">
+            <a:avLst/>
+          </a:prstGeom>
+          <a:noFill/>
+        </p:spPr>
+        <p:txBody>
+          <a:bodyPr wrap="square" rtlCol="0">
+            <a:spAutoFit/>
+          </a:bodyPr>
+          <a:lstStyle/>
+          <a:p>
+            <a:r>
+              <a:rPr lang="de-DE" dirty="0"/>
+              <a:t>WHEEL_RADIUS</a:t>
+            </a:r>
+          </a:p>
+        </p:txBody>
+      </p:sp>
+      <p:sp>
+        <p:nvSpPr>
+          <p:cNvPr id="26" name="Stern: 4 Zacken 25">
+            <a:extLst>
+              <a:ext uri="{FF2B5EF4-FFF2-40B4-BE49-F238E27FC236}">
+                <a16:creationId xmlns:a16="http://schemas.microsoft.com/office/drawing/2014/main" id="{CA7AA579-23CD-4E2D-A90D-174406ABB660}"/>
+              </a:ext>
+            </a:extLst>
+          </p:cNvPr>
+          <p:cNvSpPr/>
+          <p:nvPr/>
+        </p:nvSpPr>
+        <p:spPr>
+          <a:xfrm>
+            <a:off x="5166181" y="3385566"/>
+            <a:ext cx="658999" cy="754380"/>
+          </a:xfrm>
+          <a:prstGeom prst="star4">
+            <a:avLst/>
+          </a:prstGeom>
+        </p:spPr>
+        <p:style>
+          <a:lnRef idx="2">
+            <a:schemeClr val="accent4">
+              <a:shade val="50000"/>
+            </a:schemeClr>
+          </a:lnRef>
+          <a:fillRef idx="1">
+            <a:schemeClr val="accent4"/>
+          </a:fillRef>
+          <a:effectRef idx="0">
+            <a:schemeClr val="accent4"/>
+          </a:effectRef>
+          <a:fontRef idx="minor">
+            <a:schemeClr val="lt1"/>
+          </a:fontRef>
+        </p:style>
+        <p:txBody>
+          <a:bodyPr rtlCol="0" anchor="ctr"/>
+          <a:lstStyle/>
+          <a:p>
+            <a:pPr algn="ctr"/>
+            <a:endParaRPr lang="de-DE"/>
+          </a:p>
+        </p:txBody>
+      </p:sp>
+      <p:cxnSp>
+        <p:nvCxnSpPr>
+          <p:cNvPr id="29" name="Gerader Verbinder 28">
+            <a:extLst>
+              <a:ext uri="{FF2B5EF4-FFF2-40B4-BE49-F238E27FC236}">
+                <a16:creationId xmlns:a16="http://schemas.microsoft.com/office/drawing/2014/main" id="{76673CA8-765C-420E-AB1D-8069CA1AB3C7}"/>
+              </a:ext>
+            </a:extLst>
+          </p:cNvPr>
+          <p:cNvCxnSpPr>
+            <a:cxnSpLocks/>
+          </p:cNvCxnSpPr>
+          <p:nvPr/>
+        </p:nvCxnSpPr>
+        <p:spPr>
+          <a:xfrm flipH="1">
+            <a:off x="3846718" y="3803037"/>
+            <a:ext cx="1648964" cy="1149107"/>
+          </a:xfrm>
+          <a:prstGeom prst="line">
+            <a:avLst/>
+          </a:prstGeom>
+        </p:spPr>
+        <p:style>
+          <a:lnRef idx="1">
+            <a:schemeClr val="dk1"/>
+          </a:lnRef>
+          <a:fillRef idx="0">
+            <a:schemeClr val="dk1"/>
+          </a:fillRef>
+          <a:effectRef idx="0">
+            <a:schemeClr val="dk1"/>
+          </a:effectRef>
+          <a:fontRef idx="minor">
+            <a:schemeClr val="tx1"/>
+          </a:fontRef>
+        </p:style>
+      </p:cxnSp>
+      <p:sp>
+        <p:nvSpPr>
+          <p:cNvPr id="32" name="Textfeld 31">
+            <a:extLst>
+              <a:ext uri="{FF2B5EF4-FFF2-40B4-BE49-F238E27FC236}">
+                <a16:creationId xmlns:a16="http://schemas.microsoft.com/office/drawing/2014/main" id="{32A53CEB-7945-43E0-943F-3D53CD714372}"/>
+              </a:ext>
+            </a:extLst>
+          </p:cNvPr>
+          <p:cNvSpPr txBox="1"/>
+          <p:nvPr/>
+        </p:nvSpPr>
+        <p:spPr>
+          <a:xfrm>
+            <a:off x="2445260" y="4936808"/>
+            <a:ext cx="1573788" cy="646331"/>
+          </a:xfrm>
+          <a:prstGeom prst="rect">
+            <a:avLst/>
+          </a:prstGeom>
+          <a:noFill/>
+        </p:spPr>
+        <p:txBody>
+          <a:bodyPr wrap="square" rtlCol="0">
+            <a:spAutoFit/>
+          </a:bodyPr>
+          <a:lstStyle/>
+          <a:p>
+            <a:r>
+              <a:rPr lang="de-DE" dirty="0"/>
+              <a:t>CENTER</a:t>
+            </a:r>
+          </a:p>
+          <a:p>
+            <a:r>
+              <a:rPr lang="de-DE" dirty="0"/>
+              <a:t>(</a:t>
+            </a:r>
+            <a:r>
+              <a:rPr lang="de-DE" dirty="0" err="1"/>
+              <a:t>self.x</a:t>
+            </a:r>
+            <a:r>
+              <a:rPr lang="de-DE" dirty="0"/>
+              <a:t>, </a:t>
+            </a:r>
+            <a:r>
+              <a:rPr lang="de-DE" dirty="0" err="1"/>
+              <a:t>self.y</a:t>
+            </a:r>
+            <a:r>
+              <a:rPr lang="de-DE" dirty="0"/>
+              <a:t>)</a:t>
+            </a:r>
+          </a:p>
+        </p:txBody>
+      </p:sp>
+    </p:spTree>
+    <p:extLst>
+      <p:ext uri="{BB962C8B-B14F-4D97-AF65-F5344CB8AC3E}">
+        <p14:creationId xmlns:p14="http://schemas.microsoft.com/office/powerpoint/2010/main" val="659173435"/>
+      </p:ext>
+    </p:extLst>
+  </p:cSld>
+  <p:clrMapOvr>
+    <a:masterClrMapping/>
+  </p:clrMapOvr>
+</p:sld>
+</file>
+
+<file path=ppt/slides/slide6.xml><?xml version="1.0" encoding="utf-8"?>
+<p:sld xmlns:a="http://schemas.openxmlformats.org/drawingml/2006/main" xmlns:r="http://schemas.openxmlformats.org/officeDocument/2006/relationships" xmlns:p="http://schemas.openxmlformats.org/presentationml/2006/main">
+  <p:cSld>
+    <p:spTree>
+      <p:nvGrpSpPr>
+        <p:cNvPr id="1" name=""/>
+        <p:cNvGrpSpPr/>
+        <p:nvPr/>
+      </p:nvGrpSpPr>
+      <p:grpSpPr>
+        <a:xfrm>
+          <a:off x="0" y="0"/>
+          <a:ext cx="0" cy="0"/>
+          <a:chOff x="0" y="0"/>
+          <a:chExt cx="0" cy="0"/>
+        </a:xfrm>
+      </p:grpSpPr>
+      <p:sp>
+        <p:nvSpPr>
+          <p:cNvPr id="2" name="Titel 1">
+            <a:extLst>
+              <a:ext uri="{FF2B5EF4-FFF2-40B4-BE49-F238E27FC236}">
+                <a16:creationId xmlns:a16="http://schemas.microsoft.com/office/drawing/2014/main" id="{A50894E3-AA79-4235-93D2-5304DA709205}"/>
+              </a:ext>
+            </a:extLst>
+          </p:cNvPr>
+          <p:cNvSpPr>
+            <a:spLocks noGrp="1"/>
+          </p:cNvSpPr>
+          <p:nvPr>
+            <p:ph type="title"/>
+          </p:nvPr>
+        </p:nvSpPr>
+        <p:spPr>
+          <a:xfrm>
+            <a:off x="838200" y="229659"/>
+            <a:ext cx="10515600" cy="425097"/>
+          </a:xfrm>
+        </p:spPr>
+        <p:txBody>
+          <a:bodyPr>
+            <a:normAutofit fontScale="90000"/>
+          </a:bodyPr>
+          <a:lstStyle/>
+          <a:p>
+            <a:r>
+              <a:rPr lang="de-DE" dirty="0"/>
+              <a:t>Rotation </a:t>
+            </a:r>
+            <a:r>
+              <a:rPr lang="de-DE" dirty="0" err="1"/>
+              <a:t>mower</a:t>
+            </a:r>
+            <a:endParaRPr lang="de-DE" dirty="0"/>
+          </a:p>
+        </p:txBody>
+      </p:sp>
+      <p:grpSp>
+        <p:nvGrpSpPr>
+          <p:cNvPr id="9" name="Gruppieren 8">
+            <a:extLst>
+              <a:ext uri="{FF2B5EF4-FFF2-40B4-BE49-F238E27FC236}">
+                <a16:creationId xmlns:a16="http://schemas.microsoft.com/office/drawing/2014/main" id="{D0BD220B-DCE5-4B06-A792-706A03B18CCB}"/>
+              </a:ext>
+            </a:extLst>
+          </p:cNvPr>
+          <p:cNvGrpSpPr/>
+          <p:nvPr/>
+        </p:nvGrpSpPr>
+        <p:grpSpPr>
+          <a:xfrm rot="2162271">
+            <a:off x="1817933" y="2630310"/>
+            <a:ext cx="2246940" cy="3255603"/>
+            <a:chOff x="3931920" y="1865376"/>
+            <a:chExt cx="3236976" cy="3794760"/>
+          </a:xfrm>
+        </p:grpSpPr>
+        <p:sp>
+          <p:nvSpPr>
+            <p:cNvPr id="4" name="Rechteck 3">
+              <a:extLst>
+                <a:ext uri="{FF2B5EF4-FFF2-40B4-BE49-F238E27FC236}">
+                  <a16:creationId xmlns:a16="http://schemas.microsoft.com/office/drawing/2014/main" id="{E736858F-76E7-4285-AB8B-5E3A02077ED3}"/>
+                </a:ext>
+              </a:extLst>
+            </p:cNvPr>
+            <p:cNvSpPr/>
+            <p:nvPr/>
+          </p:nvSpPr>
+          <p:spPr>
+            <a:xfrm>
+              <a:off x="4462272" y="1865376"/>
+              <a:ext cx="2176272" cy="3794760"/>
+            </a:xfrm>
+            <a:prstGeom prst="rect">
+              <a:avLst/>
+            </a:prstGeom>
+          </p:spPr>
+          <p:style>
+            <a:lnRef idx="2">
+              <a:schemeClr val="accent1">
+                <a:shade val="50000"/>
+              </a:schemeClr>
+            </a:lnRef>
+            <a:fillRef idx="1">
+              <a:schemeClr val="accent1"/>
+            </a:fillRef>
+            <a:effectRef idx="0">
+              <a:schemeClr val="accent1"/>
+            </a:effectRef>
+            <a:fontRef idx="minor">
+              <a:schemeClr val="lt1"/>
+            </a:fontRef>
+          </p:style>
+          <p:txBody>
+            <a:bodyPr rtlCol="0" anchor="ctr"/>
+            <a:lstStyle/>
+            <a:p>
+              <a:pPr algn="ctr"/>
+              <a:endParaRPr lang="de-DE"/>
+            </a:p>
+          </p:txBody>
+        </p:sp>
+        <p:sp>
+          <p:nvSpPr>
+            <p:cNvPr id="5" name="Rechteck 4">
+              <a:extLst>
+                <a:ext uri="{FF2B5EF4-FFF2-40B4-BE49-F238E27FC236}">
+                  <a16:creationId xmlns:a16="http://schemas.microsoft.com/office/drawing/2014/main" id="{327B3C0F-6333-4967-A7E7-29A4A08C1A5C}"/>
+                </a:ext>
+              </a:extLst>
+            </p:cNvPr>
+            <p:cNvSpPr/>
+            <p:nvPr/>
+          </p:nvSpPr>
+          <p:spPr>
+            <a:xfrm>
+              <a:off x="6638544" y="3259836"/>
+              <a:ext cx="530352" cy="1005840"/>
+            </a:xfrm>
+            <a:prstGeom prst="rect">
+              <a:avLst/>
+            </a:prstGeom>
+          </p:spPr>
+          <p:style>
+            <a:lnRef idx="2">
+              <a:schemeClr val="accent1">
+                <a:shade val="50000"/>
+              </a:schemeClr>
+            </a:lnRef>
+            <a:fillRef idx="1">
+              <a:schemeClr val="accent1"/>
+            </a:fillRef>
+            <a:effectRef idx="0">
+              <a:schemeClr val="accent1"/>
+            </a:effectRef>
+            <a:fontRef idx="minor">
+              <a:schemeClr val="lt1"/>
+            </a:fontRef>
+          </p:style>
+          <p:txBody>
+            <a:bodyPr rtlCol="0" anchor="ctr"/>
+            <a:lstStyle/>
+            <a:p>
+              <a:pPr algn="ctr"/>
+              <a:endParaRPr lang="de-DE"/>
+            </a:p>
+          </p:txBody>
+        </p:sp>
+        <p:sp>
+          <p:nvSpPr>
+            <p:cNvPr id="6" name="Rechteck 5">
+              <a:extLst>
+                <a:ext uri="{FF2B5EF4-FFF2-40B4-BE49-F238E27FC236}">
+                  <a16:creationId xmlns:a16="http://schemas.microsoft.com/office/drawing/2014/main" id="{071665B1-2868-450C-A3D0-FD59E2E1B986}"/>
+                </a:ext>
+              </a:extLst>
+            </p:cNvPr>
+            <p:cNvSpPr/>
+            <p:nvPr/>
+          </p:nvSpPr>
+          <p:spPr>
+            <a:xfrm>
+              <a:off x="3931920" y="3259836"/>
+              <a:ext cx="530352" cy="1005840"/>
+            </a:xfrm>
+            <a:prstGeom prst="rect">
+              <a:avLst/>
+            </a:prstGeom>
+          </p:spPr>
+          <p:style>
+            <a:lnRef idx="2">
+              <a:schemeClr val="accent1">
+                <a:shade val="50000"/>
+              </a:schemeClr>
+            </a:lnRef>
+            <a:fillRef idx="1">
+              <a:schemeClr val="accent1"/>
+            </a:fillRef>
+            <a:effectRef idx="0">
+              <a:schemeClr val="accent1"/>
+            </a:effectRef>
+            <a:fontRef idx="minor">
+              <a:schemeClr val="lt1"/>
+            </a:fontRef>
+          </p:style>
+          <p:txBody>
+            <a:bodyPr rtlCol="0" anchor="ctr"/>
+            <a:lstStyle/>
+            <a:p>
+              <a:pPr algn="ctr"/>
+              <a:endParaRPr lang="de-DE"/>
+            </a:p>
+          </p:txBody>
+        </p:sp>
+        <p:sp>
+          <p:nvSpPr>
+            <p:cNvPr id="7" name="Gleichschenkliges Dreieck 6">
+              <a:extLst>
+                <a:ext uri="{FF2B5EF4-FFF2-40B4-BE49-F238E27FC236}">
+                  <a16:creationId xmlns:a16="http://schemas.microsoft.com/office/drawing/2014/main" id="{3919B493-A40E-4ECE-9275-6820AF608087}"/>
+                </a:ext>
+              </a:extLst>
+            </p:cNvPr>
+            <p:cNvSpPr/>
+            <p:nvPr/>
+          </p:nvSpPr>
+          <p:spPr>
+            <a:xfrm>
+              <a:off x="5189220" y="1865376"/>
+              <a:ext cx="722376" cy="539496"/>
+            </a:xfrm>
+            <a:prstGeom prst="triangle">
+              <a:avLst/>
+            </a:prstGeom>
+          </p:spPr>
+          <p:style>
+            <a:lnRef idx="2">
+              <a:schemeClr val="accent3">
+                <a:shade val="50000"/>
+              </a:schemeClr>
+            </a:lnRef>
+            <a:fillRef idx="1">
+              <a:schemeClr val="accent3"/>
+            </a:fillRef>
+            <a:effectRef idx="0">
+              <a:schemeClr val="accent3"/>
+            </a:effectRef>
+            <a:fontRef idx="minor">
+              <a:schemeClr val="lt1"/>
+            </a:fontRef>
+          </p:style>
+          <p:txBody>
+            <a:bodyPr rtlCol="0" anchor="ctr"/>
+            <a:lstStyle/>
+            <a:p>
+              <a:pPr algn="ctr"/>
+              <a:endParaRPr lang="de-DE"/>
+            </a:p>
+          </p:txBody>
+        </p:sp>
+        <p:sp>
+          <p:nvSpPr>
+            <p:cNvPr id="8" name="Stern: 4 Zacken 7">
+              <a:extLst>
+                <a:ext uri="{FF2B5EF4-FFF2-40B4-BE49-F238E27FC236}">
+                  <a16:creationId xmlns:a16="http://schemas.microsoft.com/office/drawing/2014/main" id="{22EA0CEB-E969-4F75-AA9B-40866A10BAC9}"/>
+                </a:ext>
+              </a:extLst>
+            </p:cNvPr>
+            <p:cNvSpPr/>
+            <p:nvPr/>
+          </p:nvSpPr>
+          <p:spPr>
+            <a:xfrm>
+              <a:off x="5166181" y="3385566"/>
+              <a:ext cx="658999" cy="754380"/>
+            </a:xfrm>
+            <a:prstGeom prst="star4">
+              <a:avLst/>
+            </a:prstGeom>
+          </p:spPr>
+          <p:style>
+            <a:lnRef idx="2">
+              <a:schemeClr val="accent4">
+                <a:shade val="50000"/>
+              </a:schemeClr>
+            </a:lnRef>
+            <a:fillRef idx="1">
+              <a:schemeClr val="accent4"/>
+            </a:fillRef>
+            <a:effectRef idx="0">
+              <a:schemeClr val="accent4"/>
+            </a:effectRef>
+            <a:fontRef idx="minor">
+              <a:schemeClr val="lt1"/>
+            </a:fontRef>
+          </p:style>
+          <p:txBody>
+            <a:bodyPr rtlCol="0" anchor="ctr"/>
+            <a:lstStyle/>
+            <a:p>
+              <a:pPr algn="ctr"/>
+              <a:endParaRPr lang="de-DE"/>
+            </a:p>
+          </p:txBody>
+        </p:sp>
+      </p:grpSp>
+      <p:cxnSp>
+        <p:nvCxnSpPr>
+          <p:cNvPr id="11" name="Gerade Verbindung mit Pfeil 10">
+            <a:extLst>
+              <a:ext uri="{FF2B5EF4-FFF2-40B4-BE49-F238E27FC236}">
+                <a16:creationId xmlns:a16="http://schemas.microsoft.com/office/drawing/2014/main" id="{48A677E3-4C8B-442C-A6A8-B216ACBC7DD0}"/>
+              </a:ext>
+            </a:extLst>
+          </p:cNvPr>
+          <p:cNvCxnSpPr>
+            <a:cxnSpLocks/>
+          </p:cNvCxnSpPr>
+          <p:nvPr/>
+        </p:nvCxnSpPr>
+        <p:spPr>
+          <a:xfrm flipV="1">
+            <a:off x="3683543" y="3920786"/>
+            <a:ext cx="668134" cy="916710"/>
+          </a:xfrm>
+          <a:prstGeom prst="straightConnector1">
+            <a:avLst/>
+          </a:prstGeom>
+          <a:ln>
+            <a:tailEnd type="triangle"/>
+          </a:ln>
+        </p:spPr>
+        <p:style>
+          <a:lnRef idx="1">
+            <a:schemeClr val="accent2"/>
+          </a:lnRef>
+          <a:fillRef idx="0">
+            <a:schemeClr val="accent2"/>
+          </a:fillRef>
+          <a:effectRef idx="0">
+            <a:schemeClr val="accent2"/>
+          </a:effectRef>
+          <a:fontRef idx="minor">
+            <a:schemeClr val="tx1"/>
+          </a:fontRef>
+        </p:style>
+      </p:cxnSp>
+      <p:cxnSp>
+        <p:nvCxnSpPr>
+          <p:cNvPr id="16" name="Gerader Verbinder 15">
+            <a:extLst>
+              <a:ext uri="{FF2B5EF4-FFF2-40B4-BE49-F238E27FC236}">
+                <a16:creationId xmlns:a16="http://schemas.microsoft.com/office/drawing/2014/main" id="{8ED0D96C-116F-46D6-878B-2B62798F270A}"/>
+              </a:ext>
+            </a:extLst>
+          </p:cNvPr>
+          <p:cNvCxnSpPr>
+            <a:cxnSpLocks/>
+          </p:cNvCxnSpPr>
+          <p:nvPr/>
+        </p:nvCxnSpPr>
+        <p:spPr>
+          <a:xfrm>
+            <a:off x="2181779" y="3705445"/>
+            <a:ext cx="1519249" cy="1105334"/>
+          </a:xfrm>
+          <a:prstGeom prst="line">
+            <a:avLst/>
+          </a:prstGeom>
+        </p:spPr>
+        <p:style>
+          <a:lnRef idx="1">
+            <a:schemeClr val="accent2"/>
+          </a:lnRef>
+          <a:fillRef idx="0">
+            <a:schemeClr val="accent2"/>
+          </a:fillRef>
+          <a:effectRef idx="0">
+            <a:schemeClr val="accent2"/>
+          </a:effectRef>
+          <a:fontRef idx="minor">
+            <a:schemeClr val="tx1"/>
+          </a:fontRef>
+        </p:style>
+      </p:cxnSp>
+      <p:cxnSp>
+        <p:nvCxnSpPr>
+          <p:cNvPr id="21" name="Gerader Verbinder 20">
+            <a:extLst>
+              <a:ext uri="{FF2B5EF4-FFF2-40B4-BE49-F238E27FC236}">
+                <a16:creationId xmlns:a16="http://schemas.microsoft.com/office/drawing/2014/main" id="{AF663F51-01C2-466F-962B-A5ECBE9EBDDB}"/>
+              </a:ext>
+            </a:extLst>
+          </p:cNvPr>
+          <p:cNvCxnSpPr/>
+          <p:nvPr/>
+        </p:nvCxnSpPr>
+        <p:spPr>
+          <a:xfrm>
+            <a:off x="2181779" y="3705445"/>
+            <a:ext cx="2169898" cy="215341"/>
+          </a:xfrm>
+          <a:prstGeom prst="line">
+            <a:avLst/>
+          </a:prstGeom>
+        </p:spPr>
+        <p:style>
+          <a:lnRef idx="1">
+            <a:schemeClr val="accent2"/>
+          </a:lnRef>
+          <a:fillRef idx="0">
+            <a:schemeClr val="accent2"/>
+          </a:fillRef>
+          <a:effectRef idx="0">
+            <a:schemeClr val="accent2"/>
+          </a:effectRef>
+          <a:fontRef idx="minor">
+            <a:schemeClr val="tx1"/>
+          </a:fontRef>
+        </p:style>
+      </p:cxnSp>
+      <p:sp>
+        <p:nvSpPr>
+          <p:cNvPr id="22" name="Bogen 21">
+            <a:extLst>
+              <a:ext uri="{FF2B5EF4-FFF2-40B4-BE49-F238E27FC236}">
+                <a16:creationId xmlns:a16="http://schemas.microsoft.com/office/drawing/2014/main" id="{3EB4002F-73AC-488C-A4A1-204A51D04B17}"/>
+              </a:ext>
+            </a:extLst>
+          </p:cNvPr>
+          <p:cNvSpPr/>
+          <p:nvPr/>
+        </p:nvSpPr>
+        <p:spPr>
+          <a:xfrm>
+            <a:off x="2552850" y="3673135"/>
+            <a:ext cx="356938" cy="648146"/>
+          </a:xfrm>
+          <a:prstGeom prst="arc">
+            <a:avLst>
+              <a:gd name="adj1" fmla="val 18377079"/>
+              <a:gd name="adj2" fmla="val 3253370"/>
+            </a:avLst>
+          </a:prstGeom>
+        </p:spPr>
+        <p:style>
+          <a:lnRef idx="3">
+            <a:schemeClr val="accent2"/>
+          </a:lnRef>
+          <a:fillRef idx="0">
+            <a:schemeClr val="accent2"/>
+          </a:fillRef>
+          <a:effectRef idx="2">
+            <a:schemeClr val="accent2"/>
+          </a:effectRef>
+          <a:fontRef idx="minor">
+            <a:schemeClr val="tx1"/>
+          </a:fontRef>
+        </p:style>
+        <p:txBody>
+          <a:bodyPr rtlCol="0" anchor="ctr"/>
+          <a:lstStyle/>
+          <a:p>
+            <a:pPr algn="ctr"/>
+            <a:endParaRPr lang="de-DE"/>
+          </a:p>
+        </p:txBody>
+      </p:sp>
+      <p:cxnSp>
+        <p:nvCxnSpPr>
+          <p:cNvPr id="24" name="Gerade Verbindung mit Pfeil 23">
+            <a:extLst>
+              <a:ext uri="{FF2B5EF4-FFF2-40B4-BE49-F238E27FC236}">
+                <a16:creationId xmlns:a16="http://schemas.microsoft.com/office/drawing/2014/main" id="{9B3A50DE-9518-410B-A86E-D9704FDFD22E}"/>
+              </a:ext>
+            </a:extLst>
+          </p:cNvPr>
+          <p:cNvCxnSpPr/>
+          <p:nvPr/>
+        </p:nvCxnSpPr>
+        <p:spPr>
+          <a:xfrm>
+            <a:off x="417688" y="1310817"/>
+            <a:ext cx="0" cy="5057423"/>
+          </a:xfrm>
+          <a:prstGeom prst="straightConnector1">
+            <a:avLst/>
+          </a:prstGeom>
+          <a:ln>
+            <a:tailEnd type="triangle"/>
+          </a:ln>
+        </p:spPr>
+        <p:style>
+          <a:lnRef idx="3">
+            <a:schemeClr val="dk1"/>
+          </a:lnRef>
+          <a:fillRef idx="0">
+            <a:schemeClr val="dk1"/>
+          </a:fillRef>
+          <a:effectRef idx="2">
+            <a:schemeClr val="dk1"/>
+          </a:effectRef>
+          <a:fontRef idx="minor">
+            <a:schemeClr val="tx1"/>
+          </a:fontRef>
+        </p:style>
+      </p:cxnSp>
+      <p:cxnSp>
+        <p:nvCxnSpPr>
+          <p:cNvPr id="25" name="Gerade Verbindung mit Pfeil 24">
+            <a:extLst>
+              <a:ext uri="{FF2B5EF4-FFF2-40B4-BE49-F238E27FC236}">
+                <a16:creationId xmlns:a16="http://schemas.microsoft.com/office/drawing/2014/main" id="{787EB113-3084-4E09-8731-F6175981A2D2}"/>
+              </a:ext>
+            </a:extLst>
+          </p:cNvPr>
+          <p:cNvCxnSpPr>
+            <a:cxnSpLocks/>
+          </p:cNvCxnSpPr>
+          <p:nvPr/>
+        </p:nvCxnSpPr>
+        <p:spPr>
+          <a:xfrm>
+            <a:off x="417688" y="1310061"/>
+            <a:ext cx="7449079" cy="0"/>
+          </a:xfrm>
+          <a:prstGeom prst="straightConnector1">
+            <a:avLst/>
+          </a:prstGeom>
+          <a:ln>
+            <a:tailEnd type="triangle"/>
+          </a:ln>
+        </p:spPr>
+        <p:style>
+          <a:lnRef idx="3">
+            <a:schemeClr val="dk1"/>
+          </a:lnRef>
+          <a:fillRef idx="0">
+            <a:schemeClr val="dk1"/>
+          </a:fillRef>
+          <a:effectRef idx="2">
+            <a:schemeClr val="dk1"/>
+          </a:effectRef>
+          <a:fontRef idx="minor">
+            <a:schemeClr val="tx1"/>
+          </a:fontRef>
+        </p:style>
+      </p:cxnSp>
+      <p:sp>
+        <p:nvSpPr>
+          <p:cNvPr id="28" name="Textfeld 27">
+            <a:extLst>
+              <a:ext uri="{FF2B5EF4-FFF2-40B4-BE49-F238E27FC236}">
+                <a16:creationId xmlns:a16="http://schemas.microsoft.com/office/drawing/2014/main" id="{8E545244-02CF-4A63-8912-79956F496058}"/>
+              </a:ext>
+            </a:extLst>
+          </p:cNvPr>
+          <p:cNvSpPr txBox="1"/>
+          <p:nvPr/>
+        </p:nvSpPr>
+        <p:spPr>
+          <a:xfrm>
+            <a:off x="7900634" y="1125395"/>
+            <a:ext cx="790221" cy="369332"/>
+          </a:xfrm>
+          <a:prstGeom prst="rect">
+            <a:avLst/>
+          </a:prstGeom>
+          <a:noFill/>
+        </p:spPr>
+        <p:txBody>
+          <a:bodyPr wrap="square" rtlCol="0">
+            <a:spAutoFit/>
+          </a:bodyPr>
+          <a:lstStyle/>
+          <a:p>
+            <a:r>
+              <a:rPr lang="de-DE" dirty="0"/>
+              <a:t>x</a:t>
+            </a:r>
+          </a:p>
+        </p:txBody>
+      </p:sp>
+      <p:sp>
+        <p:nvSpPr>
+          <p:cNvPr id="29" name="Textfeld 28">
+            <a:extLst>
+              <a:ext uri="{FF2B5EF4-FFF2-40B4-BE49-F238E27FC236}">
+                <a16:creationId xmlns:a16="http://schemas.microsoft.com/office/drawing/2014/main" id="{C4CA9A9D-745F-4480-948C-176E9EA22693}"/>
+              </a:ext>
+            </a:extLst>
+          </p:cNvPr>
+          <p:cNvSpPr txBox="1"/>
+          <p:nvPr/>
+        </p:nvSpPr>
+        <p:spPr>
+          <a:xfrm>
+            <a:off x="248356" y="6342460"/>
+            <a:ext cx="589829" cy="369332"/>
+          </a:xfrm>
+          <a:prstGeom prst="rect">
+            <a:avLst/>
+          </a:prstGeom>
+          <a:noFill/>
+        </p:spPr>
+        <p:txBody>
+          <a:bodyPr wrap="square" rtlCol="0">
+            <a:spAutoFit/>
+          </a:bodyPr>
+          <a:lstStyle/>
+          <a:p>
+            <a:r>
+              <a:rPr lang="de-DE" dirty="0"/>
+              <a:t>Y</a:t>
+            </a:r>
+          </a:p>
+        </p:txBody>
+      </p:sp>
+      <p:sp>
+        <p:nvSpPr>
+          <p:cNvPr id="30" name="Textfeld 29">
+            <a:extLst>
+              <a:ext uri="{FF2B5EF4-FFF2-40B4-BE49-F238E27FC236}">
+                <a16:creationId xmlns:a16="http://schemas.microsoft.com/office/drawing/2014/main" id="{77EEAB90-7C07-407B-A937-93417B1136A4}"/>
+              </a:ext>
+            </a:extLst>
+          </p:cNvPr>
+          <p:cNvSpPr txBox="1"/>
+          <p:nvPr/>
+        </p:nvSpPr>
+        <p:spPr>
+          <a:xfrm>
+            <a:off x="66144" y="1022486"/>
+            <a:ext cx="589826" cy="369332"/>
+          </a:xfrm>
+          <a:prstGeom prst="rect">
+            <a:avLst/>
+          </a:prstGeom>
+          <a:noFill/>
+        </p:spPr>
+        <p:txBody>
+          <a:bodyPr wrap="square" rtlCol="0">
+            <a:spAutoFit/>
+          </a:bodyPr>
+          <a:lstStyle/>
+          <a:p>
+            <a:r>
+              <a:rPr lang="de-DE" dirty="0"/>
+              <a:t>0, 0</a:t>
+            </a:r>
+          </a:p>
+        </p:txBody>
+      </p:sp>
+    </p:spTree>
+    <p:extLst>
+      <p:ext uri="{BB962C8B-B14F-4D97-AF65-F5344CB8AC3E}">
+        <p14:creationId xmlns:p14="http://schemas.microsoft.com/office/powerpoint/2010/main" val="1038144454"/>
+      </p:ext>
+    </p:extLst>
+  </p:cSld>
+  <p:clrMapOvr>
+    <a:masterClrMapping/>
+  </p:clrMapOvr>
+</p:sld>
+</file>
+
 <file path=ppt/theme/theme1.xml><?xml version="1.0" encoding="utf-8"?>
 <a:theme xmlns:a="http://schemas.openxmlformats.org/drawingml/2006/main" name="Office">
   <a:themeElements>

</xml_diff>